<commit_message>
added new figs, kmeanas adjusted, added prr plot (incomplete)
</commit_message>
<xml_diff>
--- a/output/PP_figure_creation.pptx
+++ b/output/PP_figure_creation.pptx
@@ -5,11 +5,12 @@
     <p:sldMasterId id="2147483648" r:id="rId1"/>
   </p:sldMasterIdLst>
   <p:notesMasterIdLst>
-    <p:notesMasterId r:id="rId4"/>
+    <p:notesMasterId r:id="rId5"/>
   </p:notesMasterIdLst>
   <p:sldIdLst>
     <p:sldId id="290" r:id="rId2"/>
-    <p:sldId id="289" r:id="rId3"/>
+    <p:sldId id="291" r:id="rId3"/>
+    <p:sldId id="289" r:id="rId4"/>
   </p:sldIdLst>
   <p:sldSz cx="12192000" cy="6858000"/>
   <p:notesSz cx="7010400" cy="9236075"/>
@@ -198,7 +199,7 @@
           <a:p>
             <a:fld id="{3C1211B4-146C-4B04-87A4-D58028F6A092}" type="datetimeFigureOut">
               <a:rPr lang="en-DE" smtClean="0"/>
-              <a:t>24/02/2025</a:t>
+              <a:t>03/04/2025</a:t>
             </a:fld>
             <a:endParaRPr lang="en-DE"/>
           </a:p>
@@ -582,6 +583,114 @@
         <p:cNvPr id="1" name="">
           <a:extLst>
             <a:ext uri="{FF2B5EF4-FFF2-40B4-BE49-F238E27FC236}">
+              <a16:creationId xmlns:a16="http://schemas.microsoft.com/office/drawing/2014/main" id="{203A8F88-DF5A-4BA9-6E35-D0C239460B88}"/>
+            </a:ext>
+          </a:extLst>
+        </p:cNvPr>
+        <p:cNvGrpSpPr/>
+        <p:nvPr/>
+      </p:nvGrpSpPr>
+      <p:grpSpPr>
+        <a:xfrm>
+          <a:off x="0" y="0"/>
+          <a:ext cx="0" cy="0"/>
+          <a:chOff x="0" y="0"/>
+          <a:chExt cx="0" cy="0"/>
+        </a:xfrm>
+      </p:grpSpPr>
+      <p:sp>
+        <p:nvSpPr>
+          <p:cNvPr id="2" name="Slide Image Placeholder 1">
+            <a:extLst>
+              <a:ext uri="{FF2B5EF4-FFF2-40B4-BE49-F238E27FC236}">
+                <a16:creationId xmlns:a16="http://schemas.microsoft.com/office/drawing/2014/main" id="{AD65A5E2-2740-C208-D150-1D2BB4E4E44E}"/>
+              </a:ext>
+            </a:extLst>
+          </p:cNvPr>
+          <p:cNvSpPr>
+            <a:spLocks noGrp="1" noRot="1" noChangeAspect="1"/>
+          </p:cNvSpPr>
+          <p:nvPr>
+            <p:ph type="sldImg"/>
+          </p:nvPr>
+        </p:nvSpPr>
+        <p:spPr/>
+      </p:sp>
+      <p:sp>
+        <p:nvSpPr>
+          <p:cNvPr id="3" name="Notes Placeholder 2">
+            <a:extLst>
+              <a:ext uri="{FF2B5EF4-FFF2-40B4-BE49-F238E27FC236}">
+                <a16:creationId xmlns:a16="http://schemas.microsoft.com/office/drawing/2014/main" id="{1EBE2936-3CBB-4605-D140-94F30F85C189}"/>
+              </a:ext>
+            </a:extLst>
+          </p:cNvPr>
+          <p:cNvSpPr>
+            <a:spLocks noGrp="1"/>
+          </p:cNvSpPr>
+          <p:nvPr>
+            <p:ph type="body" idx="1"/>
+          </p:nvPr>
+        </p:nvSpPr>
+        <p:spPr/>
+        <p:txBody>
+          <a:bodyPr/>
+          <a:lstStyle/>
+          <a:p>
+            <a:endParaRPr lang="de-DE" dirty="0"/>
+          </a:p>
+        </p:txBody>
+      </p:sp>
+      <p:sp>
+        <p:nvSpPr>
+          <p:cNvPr id="4" name="Slide Number Placeholder 3">
+            <a:extLst>
+              <a:ext uri="{FF2B5EF4-FFF2-40B4-BE49-F238E27FC236}">
+                <a16:creationId xmlns:a16="http://schemas.microsoft.com/office/drawing/2014/main" id="{DABCAF25-1238-0E08-69C1-563ABC4EF655}"/>
+              </a:ext>
+            </a:extLst>
+          </p:cNvPr>
+          <p:cNvSpPr>
+            <a:spLocks noGrp="1"/>
+          </p:cNvSpPr>
+          <p:nvPr>
+            <p:ph type="sldNum" sz="quarter" idx="5"/>
+          </p:nvPr>
+        </p:nvSpPr>
+        <p:spPr/>
+        <p:txBody>
+          <a:bodyPr/>
+          <a:lstStyle/>
+          <a:p>
+            <a:fld id="{784CA93B-B8DE-44F2-B679-09BA34A8793C}" type="slidenum">
+              <a:rPr lang="en-DE" smtClean="0"/>
+              <a:t>2</a:t>
+            </a:fld>
+            <a:endParaRPr lang="en-DE"/>
+          </a:p>
+        </p:txBody>
+      </p:sp>
+    </p:spTree>
+    <p:extLst>
+      <p:ext uri="{BB962C8B-B14F-4D97-AF65-F5344CB8AC3E}">
+        <p14:creationId xmlns:p14="http://schemas.microsoft.com/office/powerpoint/2010/main" val="3690187103"/>
+      </p:ext>
+    </p:extLst>
+  </p:cSld>
+  <p:clrMapOvr>
+    <a:masterClrMapping/>
+  </p:clrMapOvr>
+</p:notes>
+</file>
+
+<file path=ppt/notesSlides/notesSlide3.xml><?xml version="1.0" encoding="utf-8"?>
+<p:notes xmlns:a="http://schemas.openxmlformats.org/drawingml/2006/main" xmlns:r="http://schemas.openxmlformats.org/officeDocument/2006/relationships" xmlns:p="http://schemas.openxmlformats.org/presentationml/2006/main">
+  <p:cSld>
+    <p:spTree>
+      <p:nvGrpSpPr>
+        <p:cNvPr id="1" name="">
+          <a:extLst>
+            <a:ext uri="{FF2B5EF4-FFF2-40B4-BE49-F238E27FC236}">
               <a16:creationId xmlns:a16="http://schemas.microsoft.com/office/drawing/2014/main" id="{67869E9A-1D45-FF72-8A05-F2E51EB228E3}"/>
             </a:ext>
           </a:extLst>
@@ -663,7 +772,7 @@
           <a:p>
             <a:fld id="{784CA93B-B8DE-44F2-B679-09BA34A8793C}" type="slidenum">
               <a:rPr lang="en-DE" smtClean="0"/>
-              <a:t>2</a:t>
+              <a:t>3</a:t>
             </a:fld>
             <a:endParaRPr lang="en-DE"/>
           </a:p>
@@ -831,7 +940,7 @@
           <a:p>
             <a:fld id="{5C4FE0DD-1D2D-421C-AE33-F119FAA9DCC7}" type="datetimeFigureOut">
               <a:rPr lang="en-DE" smtClean="0"/>
-              <a:t>24/02/2025</a:t>
+              <a:t>03/04/2025</a:t>
             </a:fld>
             <a:endParaRPr lang="en-DE"/>
           </a:p>
@@ -1031,7 +1140,7 @@
           <a:p>
             <a:fld id="{5C4FE0DD-1D2D-421C-AE33-F119FAA9DCC7}" type="datetimeFigureOut">
               <a:rPr lang="en-DE" smtClean="0"/>
-              <a:t>24/02/2025</a:t>
+              <a:t>03/04/2025</a:t>
             </a:fld>
             <a:endParaRPr lang="en-DE"/>
           </a:p>
@@ -1241,7 +1350,7 @@
           <a:p>
             <a:fld id="{5C4FE0DD-1D2D-421C-AE33-F119FAA9DCC7}" type="datetimeFigureOut">
               <a:rPr lang="en-DE" smtClean="0"/>
-              <a:t>24/02/2025</a:t>
+              <a:t>03/04/2025</a:t>
             </a:fld>
             <a:endParaRPr lang="en-DE"/>
           </a:p>
@@ -1441,7 +1550,7 @@
           <a:p>
             <a:fld id="{5C4FE0DD-1D2D-421C-AE33-F119FAA9DCC7}" type="datetimeFigureOut">
               <a:rPr lang="en-DE" smtClean="0"/>
-              <a:t>24/02/2025</a:t>
+              <a:t>03/04/2025</a:t>
             </a:fld>
             <a:endParaRPr lang="en-DE"/>
           </a:p>
@@ -1717,7 +1826,7 @@
           <a:p>
             <a:fld id="{5C4FE0DD-1D2D-421C-AE33-F119FAA9DCC7}" type="datetimeFigureOut">
               <a:rPr lang="en-DE" smtClean="0"/>
-              <a:t>24/02/2025</a:t>
+              <a:t>03/04/2025</a:t>
             </a:fld>
             <a:endParaRPr lang="en-DE"/>
           </a:p>
@@ -1985,7 +2094,7 @@
           <a:p>
             <a:fld id="{5C4FE0DD-1D2D-421C-AE33-F119FAA9DCC7}" type="datetimeFigureOut">
               <a:rPr lang="en-DE" smtClean="0"/>
-              <a:t>24/02/2025</a:t>
+              <a:t>03/04/2025</a:t>
             </a:fld>
             <a:endParaRPr lang="en-DE"/>
           </a:p>
@@ -2400,7 +2509,7 @@
           <a:p>
             <a:fld id="{5C4FE0DD-1D2D-421C-AE33-F119FAA9DCC7}" type="datetimeFigureOut">
               <a:rPr lang="en-DE" smtClean="0"/>
-              <a:t>24/02/2025</a:t>
+              <a:t>03/04/2025</a:t>
             </a:fld>
             <a:endParaRPr lang="en-DE"/>
           </a:p>
@@ -2542,7 +2651,7 @@
           <a:p>
             <a:fld id="{5C4FE0DD-1D2D-421C-AE33-F119FAA9DCC7}" type="datetimeFigureOut">
               <a:rPr lang="en-DE" smtClean="0"/>
-              <a:t>24/02/2025</a:t>
+              <a:t>03/04/2025</a:t>
             </a:fld>
             <a:endParaRPr lang="en-DE"/>
           </a:p>
@@ -2655,7 +2764,7 @@
           <a:p>
             <a:fld id="{5C4FE0DD-1D2D-421C-AE33-F119FAA9DCC7}" type="datetimeFigureOut">
               <a:rPr lang="en-DE" smtClean="0"/>
-              <a:t>24/02/2025</a:t>
+              <a:t>03/04/2025</a:t>
             </a:fld>
             <a:endParaRPr lang="en-DE"/>
           </a:p>
@@ -2968,7 +3077,7 @@
           <a:p>
             <a:fld id="{5C4FE0DD-1D2D-421C-AE33-F119FAA9DCC7}" type="datetimeFigureOut">
               <a:rPr lang="en-DE" smtClean="0"/>
-              <a:t>24/02/2025</a:t>
+              <a:t>03/04/2025</a:t>
             </a:fld>
             <a:endParaRPr lang="en-DE"/>
           </a:p>
@@ -3257,7 +3366,7 @@
           <a:p>
             <a:fld id="{5C4FE0DD-1D2D-421C-AE33-F119FAA9DCC7}" type="datetimeFigureOut">
               <a:rPr lang="en-DE" smtClean="0"/>
-              <a:t>24/02/2025</a:t>
+              <a:t>03/04/2025</a:t>
             </a:fld>
             <a:endParaRPr lang="en-DE"/>
           </a:p>
@@ -3500,7 +3609,7 @@
           <a:p>
             <a:fld id="{5C4FE0DD-1D2D-421C-AE33-F119FAA9DCC7}" type="datetimeFigureOut">
               <a:rPr lang="en-DE" smtClean="0"/>
-              <a:t>24/02/2025</a:t>
+              <a:t>03/04/2025</a:t>
             </a:fld>
             <a:endParaRPr lang="en-DE"/>
           </a:p>
@@ -4018,7 +4127,7 @@
         </p:nvSpPr>
         <p:spPr>
           <a:xfrm>
-            <a:off x="63500" y="-280086"/>
+            <a:off x="0" y="-280140"/>
             <a:ext cx="6480000" cy="214184"/>
           </a:xfrm>
           <a:prstGeom prst="rect">
@@ -4087,10 +4196,10 @@
       </p:sp>
       <p:pic>
         <p:nvPicPr>
-          <p:cNvPr id="40" name="Picture 39">
-            <a:extLst>
-              <a:ext uri="{FF2B5EF4-FFF2-40B4-BE49-F238E27FC236}">
-                <a16:creationId xmlns:a16="http://schemas.microsoft.com/office/drawing/2014/main" id="{C1B882C3-ED9B-3EB1-7A3B-58BB01BAF2D5}"/>
+          <p:cNvPr id="50" name="Graphic 49">
+            <a:extLst>
+              <a:ext uri="{FF2B5EF4-FFF2-40B4-BE49-F238E27FC236}">
+                <a16:creationId xmlns:a16="http://schemas.microsoft.com/office/drawing/2014/main" id="{DE996E71-C937-2FC6-590F-8C589B6350DA}"/>
               </a:ext>
             </a:extLst>
           </p:cNvPr>
@@ -4102,8 +4211,8 @@
         <p:blipFill>
           <a:blip r:embed="rId4">
             <a:extLst>
-              <a:ext uri="{28A0092B-C50C-407E-A947-70E740481C1C}">
-                <a14:useLocalDpi xmlns:a14="http://schemas.microsoft.com/office/drawing/2010/main" val="0"/>
+              <a:ext uri="{96DAC541-7B7A-43D3-8B79-37D633B846F1}">
+                <asvg:svgBlip xmlns:asvg="http://schemas.microsoft.com/office/drawing/2016/SVG/main" r:embed="rId5"/>
               </a:ext>
             </a:extLst>
           </a:blip>
@@ -4113,20 +4222,395 @@
         </p:blipFill>
         <p:spPr>
           <a:xfrm>
-            <a:off x="0" y="9525"/>
-            <a:ext cx="3264415" cy="3264415"/>
+            <a:off x="64014" y="3405744"/>
+            <a:ext cx="4612843" cy="3079751"/>
           </a:xfrm>
           <a:prstGeom prst="rect">
             <a:avLst/>
           </a:prstGeom>
         </p:spPr>
       </p:pic>
+      <p:sp>
+        <p:nvSpPr>
+          <p:cNvPr id="51" name="TextBox 50">
+            <a:extLst>
+              <a:ext uri="{FF2B5EF4-FFF2-40B4-BE49-F238E27FC236}">
+                <a16:creationId xmlns:a16="http://schemas.microsoft.com/office/drawing/2014/main" id="{29F2BC9A-3882-7840-A999-BDE1D6C73711}"/>
+              </a:ext>
+            </a:extLst>
+          </p:cNvPr>
+          <p:cNvSpPr txBox="1"/>
+          <p:nvPr/>
+        </p:nvSpPr>
+        <p:spPr>
+          <a:xfrm>
+            <a:off x="9439790" y="724584"/>
+            <a:ext cx="2247385" cy="1477328"/>
+          </a:xfrm>
+          <a:prstGeom prst="rect">
+            <a:avLst/>
+          </a:prstGeom>
+          <a:noFill/>
+        </p:spPr>
+        <p:txBody>
+          <a:bodyPr wrap="square">
+            <a:spAutoFit/>
+          </a:bodyPr>
+          <a:lstStyle/>
+          <a:p>
+            <a:r>
+              <a:rPr lang="en-GB" noProof="0" dirty="0" err="1"/>
+              <a:t>Kmeans</a:t>
+            </a:r>
+            <a:r>
+              <a:rPr lang="en-GB" noProof="0" dirty="0"/>
+              <a:t> (K=2) based on TP=0 </a:t>
+            </a:r>
+            <a:r>
+              <a:rPr lang="en-GB" noProof="0" dirty="0">
+                <a:sym typeface="Wingdings" panose="05000000000000000000" pitchFamily="2" charset="2"/>
+              </a:rPr>
+              <a:t> creates two groups of high and low motor score patients</a:t>
+            </a:r>
+            <a:endParaRPr lang="en-GB" noProof="0" dirty="0"/>
+          </a:p>
+        </p:txBody>
+      </p:sp>
+      <p:sp>
+        <p:nvSpPr>
+          <p:cNvPr id="54" name="TextBox 53">
+            <a:extLst>
+              <a:ext uri="{FF2B5EF4-FFF2-40B4-BE49-F238E27FC236}">
+                <a16:creationId xmlns:a16="http://schemas.microsoft.com/office/drawing/2014/main" id="{FE615932-1AC4-CB8C-C8E8-33EC45163D46}"/>
+              </a:ext>
+            </a:extLst>
+          </p:cNvPr>
+          <p:cNvSpPr txBox="1"/>
+          <p:nvPr/>
+        </p:nvSpPr>
+        <p:spPr>
+          <a:xfrm rot="16200000">
+            <a:off x="-950820" y="4614513"/>
+            <a:ext cx="2740357" cy="369332"/>
+          </a:xfrm>
+          <a:prstGeom prst="rect">
+            <a:avLst/>
+          </a:prstGeom>
+          <a:solidFill>
+            <a:schemeClr val="bg1"/>
+          </a:solidFill>
+        </p:spPr>
+        <p:txBody>
+          <a:bodyPr wrap="square">
+            <a:spAutoFit/>
+          </a:bodyPr>
+          <a:lstStyle/>
+          <a:p>
+            <a:r>
+              <a:rPr lang="en-GB" noProof="0" dirty="0"/>
+              <a:t>Distance to separation line</a:t>
+            </a:r>
+          </a:p>
+        </p:txBody>
+      </p:sp>
+      <p:sp>
+        <p:nvSpPr>
+          <p:cNvPr id="55" name="TextBox 54">
+            <a:extLst>
+              <a:ext uri="{FF2B5EF4-FFF2-40B4-BE49-F238E27FC236}">
+                <a16:creationId xmlns:a16="http://schemas.microsoft.com/office/drawing/2014/main" id="{C7EDF7B9-3734-8C5E-9681-42AF417C38B9}"/>
+              </a:ext>
+            </a:extLst>
+          </p:cNvPr>
+          <p:cNvSpPr txBox="1"/>
+          <p:nvPr/>
+        </p:nvSpPr>
+        <p:spPr>
+          <a:xfrm>
+            <a:off x="234692" y="6490899"/>
+            <a:ext cx="4870337" cy="276999"/>
+          </a:xfrm>
+          <a:prstGeom prst="rect">
+            <a:avLst/>
+          </a:prstGeom>
+          <a:noFill/>
+        </p:spPr>
+        <p:txBody>
+          <a:bodyPr wrap="square">
+            <a:spAutoFit/>
+          </a:bodyPr>
+          <a:lstStyle/>
+          <a:p>
+            <a:r>
+              <a:rPr lang="en-GB" sz="1200" b="1" noProof="0" dirty="0"/>
+              <a:t>Negative values are beneath the line, positive values are above the line</a:t>
+            </a:r>
+          </a:p>
+        </p:txBody>
+      </p:sp>
+      <p:sp>
+        <p:nvSpPr>
+          <p:cNvPr id="56" name="TextBox 55">
+            <a:extLst>
+              <a:ext uri="{FF2B5EF4-FFF2-40B4-BE49-F238E27FC236}">
+                <a16:creationId xmlns:a16="http://schemas.microsoft.com/office/drawing/2014/main" id="{4926BF59-15FD-6578-FBC5-3311BFE86E65}"/>
+              </a:ext>
+            </a:extLst>
+          </p:cNvPr>
+          <p:cNvSpPr txBox="1"/>
+          <p:nvPr/>
+        </p:nvSpPr>
+        <p:spPr>
+          <a:xfrm>
+            <a:off x="7491306" y="3925360"/>
+            <a:ext cx="2006266" cy="923330"/>
+          </a:xfrm>
+          <a:prstGeom prst="rect">
+            <a:avLst/>
+          </a:prstGeom>
+          <a:noFill/>
+        </p:spPr>
+        <p:txBody>
+          <a:bodyPr wrap="square">
+            <a:spAutoFit/>
+          </a:bodyPr>
+          <a:lstStyle/>
+          <a:p>
+            <a:r>
+              <a:rPr lang="de-DE" dirty="0"/>
+              <a:t>Spagetti Plot </a:t>
+            </a:r>
+            <a:r>
+              <a:rPr lang="de-DE" dirty="0" err="1"/>
+              <a:t>of</a:t>
+            </a:r>
+            <a:r>
+              <a:rPr lang="de-DE" dirty="0"/>
+              <a:t> </a:t>
+            </a:r>
+            <a:r>
+              <a:rPr lang="de-DE" dirty="0" err="1"/>
+              <a:t>the</a:t>
+            </a:r>
+            <a:r>
+              <a:rPr lang="de-DE" dirty="0"/>
+              <a:t> </a:t>
+            </a:r>
+            <a:r>
+              <a:rPr lang="de-DE" dirty="0" err="1"/>
+              <a:t>low</a:t>
+            </a:r>
+            <a:r>
+              <a:rPr lang="de-DE" dirty="0"/>
+              <a:t> </a:t>
+            </a:r>
+            <a:r>
+              <a:rPr lang="de-DE" dirty="0" err="1"/>
+              <a:t>motor</a:t>
+            </a:r>
+            <a:r>
+              <a:rPr lang="de-DE" dirty="0"/>
+              <a:t> score </a:t>
+            </a:r>
+            <a:r>
+              <a:rPr lang="de-DE" dirty="0" err="1"/>
+              <a:t>group</a:t>
+            </a:r>
+            <a:endParaRPr lang="de-DE" dirty="0"/>
+          </a:p>
+        </p:txBody>
+      </p:sp>
+      <p:sp>
+        <p:nvSpPr>
+          <p:cNvPr id="57" name="TextBox 56">
+            <a:extLst>
+              <a:ext uri="{FF2B5EF4-FFF2-40B4-BE49-F238E27FC236}">
+                <a16:creationId xmlns:a16="http://schemas.microsoft.com/office/drawing/2014/main" id="{9391366E-1370-B471-1307-8C8D1BCF7907}"/>
+              </a:ext>
+            </a:extLst>
+          </p:cNvPr>
+          <p:cNvSpPr txBox="1"/>
+          <p:nvPr/>
+        </p:nvSpPr>
+        <p:spPr>
+          <a:xfrm>
+            <a:off x="933450" y="6061185"/>
+            <a:ext cx="1257299" cy="338554"/>
+          </a:xfrm>
+          <a:prstGeom prst="rect">
+            <a:avLst/>
+          </a:prstGeom>
+          <a:solidFill>
+            <a:schemeClr val="bg1"/>
+          </a:solidFill>
+        </p:spPr>
+        <p:txBody>
+          <a:bodyPr wrap="square">
+            <a:spAutoFit/>
+          </a:bodyPr>
+          <a:lstStyle/>
+          <a:p>
+            <a:r>
+              <a:rPr lang="de-DE" sz="1600" dirty="0"/>
+              <a:t>Low   High</a:t>
+            </a:r>
+          </a:p>
+        </p:txBody>
+      </p:sp>
+      <p:sp>
+        <p:nvSpPr>
+          <p:cNvPr id="59" name="TextBox 58">
+            <a:extLst>
+              <a:ext uri="{FF2B5EF4-FFF2-40B4-BE49-F238E27FC236}">
+                <a16:creationId xmlns:a16="http://schemas.microsoft.com/office/drawing/2014/main" id="{DF082501-4FC4-B718-1180-D6375326A5D7}"/>
+              </a:ext>
+            </a:extLst>
+          </p:cNvPr>
+          <p:cNvSpPr txBox="1"/>
+          <p:nvPr/>
+        </p:nvSpPr>
+        <p:spPr>
+          <a:xfrm>
+            <a:off x="2178444" y="6085013"/>
+            <a:ext cx="1257299" cy="338554"/>
+          </a:xfrm>
+          <a:prstGeom prst="rect">
+            <a:avLst/>
+          </a:prstGeom>
+          <a:solidFill>
+            <a:schemeClr val="bg1"/>
+          </a:solidFill>
+        </p:spPr>
+        <p:txBody>
+          <a:bodyPr wrap="square">
+            <a:spAutoFit/>
+          </a:bodyPr>
+          <a:lstStyle/>
+          <a:p>
+            <a:r>
+              <a:rPr lang="de-DE" sz="1600" dirty="0"/>
+              <a:t>Low   High</a:t>
+            </a:r>
+          </a:p>
+        </p:txBody>
+      </p:sp>
+      <p:sp>
+        <p:nvSpPr>
+          <p:cNvPr id="60" name="TextBox 59">
+            <a:extLst>
+              <a:ext uri="{FF2B5EF4-FFF2-40B4-BE49-F238E27FC236}">
+                <a16:creationId xmlns:a16="http://schemas.microsoft.com/office/drawing/2014/main" id="{1D5327A2-C850-4BEC-8D5C-5B2E15C79C83}"/>
+              </a:ext>
+            </a:extLst>
+          </p:cNvPr>
+          <p:cNvSpPr txBox="1"/>
+          <p:nvPr/>
+        </p:nvSpPr>
+        <p:spPr>
+          <a:xfrm>
+            <a:off x="3503165" y="6061185"/>
+            <a:ext cx="1257299" cy="338554"/>
+          </a:xfrm>
+          <a:prstGeom prst="rect">
+            <a:avLst/>
+          </a:prstGeom>
+          <a:solidFill>
+            <a:schemeClr val="bg1"/>
+          </a:solidFill>
+        </p:spPr>
+        <p:txBody>
+          <a:bodyPr wrap="square">
+            <a:spAutoFit/>
+          </a:bodyPr>
+          <a:lstStyle/>
+          <a:p>
+            <a:r>
+              <a:rPr lang="de-DE" sz="1600" dirty="0"/>
+              <a:t>Low   High</a:t>
+            </a:r>
+          </a:p>
+        </p:txBody>
+      </p:sp>
+      <p:sp>
+        <p:nvSpPr>
+          <p:cNvPr id="61" name="TextBox 60">
+            <a:extLst>
+              <a:ext uri="{FF2B5EF4-FFF2-40B4-BE49-F238E27FC236}">
+                <a16:creationId xmlns:a16="http://schemas.microsoft.com/office/drawing/2014/main" id="{9B58EC3E-B4DD-A86F-4799-E01CBD6120D9}"/>
+              </a:ext>
+            </a:extLst>
+          </p:cNvPr>
+          <p:cNvSpPr txBox="1"/>
+          <p:nvPr/>
+        </p:nvSpPr>
+        <p:spPr>
+          <a:xfrm rot="16200000">
+            <a:off x="3919518" y="4666684"/>
+            <a:ext cx="2740357" cy="369332"/>
+          </a:xfrm>
+          <a:prstGeom prst="rect">
+            <a:avLst/>
+          </a:prstGeom>
+          <a:solidFill>
+            <a:schemeClr val="bg1"/>
+          </a:solidFill>
+        </p:spPr>
+        <p:txBody>
+          <a:bodyPr wrap="square">
+            <a:spAutoFit/>
+          </a:bodyPr>
+          <a:lstStyle/>
+          <a:p>
+            <a:r>
+              <a:rPr lang="en-GB" noProof="0" dirty="0"/>
+              <a:t>Distance to separation line</a:t>
+            </a:r>
+          </a:p>
+        </p:txBody>
+      </p:sp>
+      <p:sp>
+        <p:nvSpPr>
+          <p:cNvPr id="62" name="TextBox 61">
+            <a:extLst>
+              <a:ext uri="{FF2B5EF4-FFF2-40B4-BE49-F238E27FC236}">
+                <a16:creationId xmlns:a16="http://schemas.microsoft.com/office/drawing/2014/main" id="{16DA1ADA-66D3-7802-2CAD-6C16B6968B71}"/>
+              </a:ext>
+            </a:extLst>
+          </p:cNvPr>
+          <p:cNvSpPr txBox="1"/>
+          <p:nvPr/>
+        </p:nvSpPr>
+        <p:spPr>
+          <a:xfrm>
+            <a:off x="5839964" y="6423567"/>
+            <a:ext cx="1438538" cy="369332"/>
+          </a:xfrm>
+          <a:prstGeom prst="rect">
+            <a:avLst/>
+          </a:prstGeom>
+          <a:solidFill>
+            <a:schemeClr val="bg1"/>
+          </a:solidFill>
+        </p:spPr>
+        <p:txBody>
+          <a:bodyPr wrap="square">
+            <a:spAutoFit/>
+          </a:bodyPr>
+          <a:lstStyle/>
+          <a:p>
+            <a:r>
+              <a:rPr lang="de-DE" dirty="0"/>
+              <a:t>Time Point</a:t>
+            </a:r>
+          </a:p>
+        </p:txBody>
+      </p:sp>
       <p:pic>
         <p:nvPicPr>
-          <p:cNvPr id="42" name="Picture 41">
-            <a:extLst>
-              <a:ext uri="{FF2B5EF4-FFF2-40B4-BE49-F238E27FC236}">
-                <a16:creationId xmlns:a16="http://schemas.microsoft.com/office/drawing/2014/main" id="{3F98DC5A-8197-4214-9C86-60B51C2746BC}"/>
+          <p:cNvPr id="66" name="Picture 65">
+            <a:extLst>
+              <a:ext uri="{FF2B5EF4-FFF2-40B4-BE49-F238E27FC236}">
+                <a16:creationId xmlns:a16="http://schemas.microsoft.com/office/drawing/2014/main" id="{A75A563C-90A9-16CA-C3BF-F3E6E26246A7}"/>
               </a:ext>
             </a:extLst>
           </p:cNvPr>
@@ -4136,21 +4620,15 @@
           <p:nvPr/>
         </p:nvPicPr>
         <p:blipFill>
-          <a:blip r:embed="rId5">
-            <a:extLst>
-              <a:ext uri="{28A0092B-C50C-407E-A947-70E740481C1C}">
-                <a14:useLocalDpi xmlns:a14="http://schemas.microsoft.com/office/drawing/2010/main" val="0"/>
-              </a:ext>
-            </a:extLst>
-          </a:blip>
+          <a:blip r:embed="rId6"/>
           <a:stretch>
             <a:fillRect/>
           </a:stretch>
         </p:blipFill>
         <p:spPr>
           <a:xfrm>
-            <a:off x="3044650" y="75427"/>
-            <a:ext cx="3264415" cy="3264415"/>
+            <a:off x="10133768" y="2776814"/>
+            <a:ext cx="3106813" cy="4143752"/>
           </a:xfrm>
           <a:prstGeom prst="rect">
             <a:avLst/>
@@ -4159,10 +4637,10 @@
       </p:pic>
       <p:pic>
         <p:nvPicPr>
-          <p:cNvPr id="38" name="Picture 37">
-            <a:extLst>
-              <a:ext uri="{FF2B5EF4-FFF2-40B4-BE49-F238E27FC236}">
-                <a16:creationId xmlns:a16="http://schemas.microsoft.com/office/drawing/2014/main" id="{1C2D481A-A8B8-3088-EE2F-BED4AF58BED3}"/>
+          <p:cNvPr id="19" name="Graphic 18">
+            <a:extLst>
+              <a:ext uri="{FF2B5EF4-FFF2-40B4-BE49-F238E27FC236}">
+                <a16:creationId xmlns:a16="http://schemas.microsoft.com/office/drawing/2014/main" id="{881769C7-4911-2305-BFF5-13CED47B6D1C}"/>
               </a:ext>
             </a:extLst>
           </p:cNvPr>
@@ -4172,10 +4650,10 @@
           <p:nvPr/>
         </p:nvPicPr>
         <p:blipFill>
-          <a:blip r:embed="rId6">
-            <a:extLst>
-              <a:ext uri="{28A0092B-C50C-407E-A947-70E740481C1C}">
-                <a14:useLocalDpi xmlns:a14="http://schemas.microsoft.com/office/drawing/2010/main" val="0"/>
+          <a:blip r:embed="rId7">
+            <a:extLst>
+              <a:ext uri="{96DAC541-7B7A-43D3-8B79-37D633B846F1}">
+                <asvg:svgBlip xmlns:asvg="http://schemas.microsoft.com/office/drawing/2016/SVG/main" r:embed="rId8"/>
               </a:ext>
             </a:extLst>
           </a:blip>
@@ -4185,20 +4663,56 @@
         </p:blipFill>
         <p:spPr>
           <a:xfrm>
-            <a:off x="6156325" y="95250"/>
-            <a:ext cx="3264415" cy="3264415"/>
+            <a:off x="0" y="35997"/>
+            <a:ext cx="6480000" cy="2163149"/>
           </a:xfrm>
           <a:prstGeom prst="rect">
             <a:avLst/>
           </a:prstGeom>
         </p:spPr>
       </p:pic>
-      <p:sp>
-        <p:nvSpPr>
-          <p:cNvPr id="43" name="Rectangle 42">
-            <a:extLst>
-              <a:ext uri="{FF2B5EF4-FFF2-40B4-BE49-F238E27FC236}">
-                <a16:creationId xmlns:a16="http://schemas.microsoft.com/office/drawing/2014/main" id="{C3F5FE0F-23C3-BAE4-0661-40F9708FC828}"/>
+    </p:spTree>
+    <p:extLst>
+      <p:ext uri="{BB962C8B-B14F-4D97-AF65-F5344CB8AC3E}">
+        <p14:creationId xmlns:p14="http://schemas.microsoft.com/office/powerpoint/2010/main" val="3901278525"/>
+      </p:ext>
+    </p:extLst>
+  </p:cSld>
+  <p:clrMapOvr>
+    <a:masterClrMapping/>
+  </p:clrMapOvr>
+</p:sld>
+</file>
+
+<file path=ppt/slides/slide2.xml><?xml version="1.0" encoding="utf-8"?>
+<p:sld xmlns:a="http://schemas.openxmlformats.org/drawingml/2006/main" xmlns:r="http://schemas.openxmlformats.org/officeDocument/2006/relationships" xmlns:p="http://schemas.openxmlformats.org/presentationml/2006/main">
+  <p:cSld>
+    <p:spTree>
+      <p:nvGrpSpPr>
+        <p:cNvPr id="1" name="">
+          <a:extLst>
+            <a:ext uri="{FF2B5EF4-FFF2-40B4-BE49-F238E27FC236}">
+              <a16:creationId xmlns:a16="http://schemas.microsoft.com/office/drawing/2014/main" id="{8DE78B07-9AC5-A1DF-3F00-4561CDEC6F83}"/>
+            </a:ext>
+          </a:extLst>
+        </p:cNvPr>
+        <p:cNvGrpSpPr/>
+        <p:nvPr/>
+      </p:nvGrpSpPr>
+      <p:grpSpPr>
+        <a:xfrm>
+          <a:off x="0" y="0"/>
+          <a:ext cx="0" cy="0"/>
+          <a:chOff x="0" y="0"/>
+          <a:chExt cx="0" cy="0"/>
+        </a:xfrm>
+      </p:grpSpPr>
+      <p:sp>
+        <p:nvSpPr>
+          <p:cNvPr id="4" name="Rectangle 3">
+            <a:extLst>
+              <a:ext uri="{FF2B5EF4-FFF2-40B4-BE49-F238E27FC236}">
+                <a16:creationId xmlns:a16="http://schemas.microsoft.com/office/drawing/2014/main" id="{35518C4E-F0AA-6600-CF0A-596BAF0E0B0B}"/>
               </a:ext>
             </a:extLst>
           </p:cNvPr>
@@ -4207,15 +4721,12 @@
         </p:nvSpPr>
         <p:spPr>
           <a:xfrm>
-            <a:off x="727470" y="17849"/>
-            <a:ext cx="2159000" cy="264298"/>
+            <a:off x="8952000" y="-291155"/>
+            <a:ext cx="3240000" cy="214184"/>
           </a:xfrm>
           <a:prstGeom prst="rect">
             <a:avLst/>
           </a:prstGeom>
-          <a:solidFill>
-            <a:schemeClr val="tx1"/>
-          </a:solidFill>
         </p:spPr>
         <p:style>
           <a:lnRef idx="2">
@@ -4238,20 +4749,16 @@
           <a:lstStyle/>
           <a:p>
             <a:pPr algn="ctr"/>
-            <a:r>
-              <a:rPr lang="en-US" dirty="0"/>
-              <a:t>TP0</a:t>
-            </a:r>
-            <a:endParaRPr lang="de-DE" dirty="0"/>
-          </a:p>
-        </p:txBody>
-      </p:sp>
-      <p:sp>
-        <p:nvSpPr>
-          <p:cNvPr id="44" name="Rectangle 43">
-            <a:extLst>
-              <a:ext uri="{FF2B5EF4-FFF2-40B4-BE49-F238E27FC236}">
-                <a16:creationId xmlns:a16="http://schemas.microsoft.com/office/drawing/2014/main" id="{E1326D86-EB5D-9DB0-0D62-0D9C9A31C63E}"/>
+            <a:endParaRPr lang="en-DE"/>
+          </a:p>
+        </p:txBody>
+      </p:sp>
+      <p:sp>
+        <p:nvSpPr>
+          <p:cNvPr id="3" name="Rectangle 2">
+            <a:extLst>
+              <a:ext uri="{FF2B5EF4-FFF2-40B4-BE49-F238E27FC236}">
+                <a16:creationId xmlns:a16="http://schemas.microsoft.com/office/drawing/2014/main" id="{36E04DA7-F20C-3A37-F18F-37512478E637}"/>
               </a:ext>
             </a:extLst>
           </p:cNvPr>
@@ -4260,15 +4767,12 @@
         </p:nvSpPr>
         <p:spPr>
           <a:xfrm>
-            <a:off x="3680964" y="95250"/>
-            <a:ext cx="2159000" cy="264298"/>
+            <a:off x="63500" y="-280086"/>
+            <a:ext cx="6480000" cy="214184"/>
           </a:xfrm>
           <a:prstGeom prst="rect">
             <a:avLst/>
           </a:prstGeom>
-          <a:solidFill>
-            <a:schemeClr val="tx1"/>
-          </a:solidFill>
         </p:spPr>
         <p:style>
           <a:lnRef idx="2">
@@ -4291,73 +4795,16 @@
           <a:lstStyle/>
           <a:p>
             <a:pPr algn="ctr"/>
-            <a:r>
-              <a:rPr lang="en-US" dirty="0"/>
-              <a:t>TP1</a:t>
-            </a:r>
-            <a:endParaRPr lang="de-DE" dirty="0"/>
-          </a:p>
-        </p:txBody>
-      </p:sp>
-      <p:sp>
-        <p:nvSpPr>
-          <p:cNvPr id="45" name="Rectangle 44">
-            <a:extLst>
-              <a:ext uri="{FF2B5EF4-FFF2-40B4-BE49-F238E27FC236}">
-                <a16:creationId xmlns:a16="http://schemas.microsoft.com/office/drawing/2014/main" id="{41A56E44-4820-34C8-0430-44FCFAE96606}"/>
-              </a:ext>
-            </a:extLst>
-          </p:cNvPr>
-          <p:cNvSpPr/>
-          <p:nvPr/>
-        </p:nvSpPr>
-        <p:spPr>
-          <a:xfrm>
-            <a:off x="6792639" y="95250"/>
-            <a:ext cx="2159000" cy="264298"/>
-          </a:xfrm>
-          <a:prstGeom prst="rect">
-            <a:avLst/>
-          </a:prstGeom>
-          <a:solidFill>
-            <a:schemeClr val="tx1"/>
-          </a:solidFill>
-        </p:spPr>
-        <p:style>
-          <a:lnRef idx="2">
-            <a:schemeClr val="accent1">
-              <a:shade val="15000"/>
-            </a:schemeClr>
-          </a:lnRef>
-          <a:fillRef idx="1">
-            <a:schemeClr val="accent1"/>
-          </a:fillRef>
-          <a:effectRef idx="0">
-            <a:schemeClr val="accent1"/>
-          </a:effectRef>
-          <a:fontRef idx="minor">
-            <a:schemeClr val="lt1"/>
-          </a:fontRef>
-        </p:style>
-        <p:txBody>
-          <a:bodyPr rtlCol="0" anchor="ctr"/>
-          <a:lstStyle/>
-          <a:p>
-            <a:pPr algn="ctr"/>
-            <a:r>
-              <a:rPr lang="en-US" dirty="0"/>
-              <a:t>TP2</a:t>
-            </a:r>
-            <a:endParaRPr lang="de-DE" dirty="0"/>
+            <a:endParaRPr lang="en-DE"/>
           </a:p>
         </p:txBody>
       </p:sp>
       <p:pic>
         <p:nvPicPr>
-          <p:cNvPr id="50" name="Graphic 49">
-            <a:extLst>
-              <a:ext uri="{FF2B5EF4-FFF2-40B4-BE49-F238E27FC236}">
-                <a16:creationId xmlns:a16="http://schemas.microsoft.com/office/drawing/2014/main" id="{DE996E71-C937-2FC6-590F-8C589B6350DA}"/>
+          <p:cNvPr id="5" name="Graphic 4">
+            <a:extLst>
+              <a:ext uri="{FF2B5EF4-FFF2-40B4-BE49-F238E27FC236}">
+                <a16:creationId xmlns:a16="http://schemas.microsoft.com/office/drawing/2014/main" id="{4040667C-44FA-A9D3-FAFA-E78A58245C1A}"/>
               </a:ext>
             </a:extLst>
           </p:cNvPr>
@@ -4367,408 +4814,32 @@
           <p:nvPr/>
         </p:nvPicPr>
         <p:blipFill>
-          <a:blip r:embed="rId7">
+          <a:blip r:embed="rId3">
             <a:extLst>
               <a:ext uri="{96DAC541-7B7A-43D3-8B79-37D633B846F1}">
-                <asvg:svgBlip xmlns:asvg="http://schemas.microsoft.com/office/drawing/2016/SVG/main" r:embed="rId8"/>
+                <asvg:svgBlip xmlns:asvg="http://schemas.microsoft.com/office/drawing/2016/SVG/main" r:embed="rId4"/>
               </a:ext>
             </a:extLst>
           </a:blip>
-          <a:stretch>
-            <a:fillRect/>
-          </a:stretch>
+          <a:srcRect t="5359" r="42148"/>
+          <a:stretch/>
         </p:blipFill>
         <p:spPr>
           <a:xfrm>
-            <a:off x="64014" y="3405744"/>
-            <a:ext cx="4612843" cy="3079751"/>
+            <a:off x="185457" y="183776"/>
+            <a:ext cx="2369484" cy="3245224"/>
           </a:xfrm>
           <a:prstGeom prst="rect">
             <a:avLst/>
           </a:prstGeom>
         </p:spPr>
       </p:pic>
-      <p:sp>
-        <p:nvSpPr>
-          <p:cNvPr id="51" name="TextBox 50">
-            <a:extLst>
-              <a:ext uri="{FF2B5EF4-FFF2-40B4-BE49-F238E27FC236}">
-                <a16:creationId xmlns:a16="http://schemas.microsoft.com/office/drawing/2014/main" id="{29F2BC9A-3882-7840-A999-BDE1D6C73711}"/>
-              </a:ext>
-            </a:extLst>
-          </p:cNvPr>
-          <p:cNvSpPr txBox="1"/>
-          <p:nvPr/>
-        </p:nvSpPr>
-        <p:spPr>
-          <a:xfrm>
-            <a:off x="9439790" y="724584"/>
-            <a:ext cx="2247385" cy="1477328"/>
-          </a:xfrm>
-          <a:prstGeom prst="rect">
-            <a:avLst/>
-          </a:prstGeom>
-          <a:noFill/>
-        </p:spPr>
-        <p:txBody>
-          <a:bodyPr wrap="square">
-            <a:spAutoFit/>
-          </a:bodyPr>
-          <a:lstStyle/>
-          <a:p>
-            <a:r>
-              <a:rPr lang="en-GB" noProof="0" dirty="0" err="1"/>
-              <a:t>Kmeans</a:t>
-            </a:r>
-            <a:r>
-              <a:rPr lang="en-GB" noProof="0" dirty="0"/>
-              <a:t> (K=2) based on TP=0 </a:t>
-            </a:r>
-            <a:r>
-              <a:rPr lang="en-GB" noProof="0" dirty="0">
-                <a:sym typeface="Wingdings" panose="05000000000000000000" pitchFamily="2" charset="2"/>
-              </a:rPr>
-              <a:t> creates two groups of high and low motor score patients</a:t>
-            </a:r>
-            <a:endParaRPr lang="en-GB" noProof="0" dirty="0"/>
-          </a:p>
-        </p:txBody>
-      </p:sp>
-      <p:sp>
-        <p:nvSpPr>
-          <p:cNvPr id="54" name="TextBox 53">
-            <a:extLst>
-              <a:ext uri="{FF2B5EF4-FFF2-40B4-BE49-F238E27FC236}">
-                <a16:creationId xmlns:a16="http://schemas.microsoft.com/office/drawing/2014/main" id="{FE615932-1AC4-CB8C-C8E8-33EC45163D46}"/>
-              </a:ext>
-            </a:extLst>
-          </p:cNvPr>
-          <p:cNvSpPr txBox="1"/>
-          <p:nvPr/>
-        </p:nvSpPr>
-        <p:spPr>
-          <a:xfrm rot="16200000">
-            <a:off x="-950820" y="4614513"/>
-            <a:ext cx="2740357" cy="369332"/>
-          </a:xfrm>
-          <a:prstGeom prst="rect">
-            <a:avLst/>
-          </a:prstGeom>
-          <a:solidFill>
-            <a:schemeClr val="bg1"/>
-          </a:solidFill>
-        </p:spPr>
-        <p:txBody>
-          <a:bodyPr wrap="square">
-            <a:spAutoFit/>
-          </a:bodyPr>
-          <a:lstStyle/>
-          <a:p>
-            <a:r>
-              <a:rPr lang="en-GB" noProof="0" dirty="0"/>
-              <a:t>Distance to separation line</a:t>
-            </a:r>
-          </a:p>
-        </p:txBody>
-      </p:sp>
-      <p:sp>
-        <p:nvSpPr>
-          <p:cNvPr id="55" name="TextBox 54">
-            <a:extLst>
-              <a:ext uri="{FF2B5EF4-FFF2-40B4-BE49-F238E27FC236}">
-                <a16:creationId xmlns:a16="http://schemas.microsoft.com/office/drawing/2014/main" id="{C7EDF7B9-3734-8C5E-9681-42AF417C38B9}"/>
-              </a:ext>
-            </a:extLst>
-          </p:cNvPr>
-          <p:cNvSpPr txBox="1"/>
-          <p:nvPr/>
-        </p:nvSpPr>
-        <p:spPr>
-          <a:xfrm>
-            <a:off x="234692" y="6490899"/>
-            <a:ext cx="4870337" cy="276999"/>
-          </a:xfrm>
-          <a:prstGeom prst="rect">
-            <a:avLst/>
-          </a:prstGeom>
-          <a:noFill/>
-        </p:spPr>
-        <p:txBody>
-          <a:bodyPr wrap="square">
-            <a:spAutoFit/>
-          </a:bodyPr>
-          <a:lstStyle/>
-          <a:p>
-            <a:r>
-              <a:rPr lang="en-GB" sz="1200" b="1" noProof="0" dirty="0"/>
-              <a:t>Negative values are beneath the line, positive values are above the line</a:t>
-            </a:r>
-          </a:p>
-        </p:txBody>
-      </p:sp>
-      <p:sp>
-        <p:nvSpPr>
-          <p:cNvPr id="56" name="TextBox 55">
-            <a:extLst>
-              <a:ext uri="{FF2B5EF4-FFF2-40B4-BE49-F238E27FC236}">
-                <a16:creationId xmlns:a16="http://schemas.microsoft.com/office/drawing/2014/main" id="{4926BF59-15FD-6578-FBC5-3311BFE86E65}"/>
-              </a:ext>
-            </a:extLst>
-          </p:cNvPr>
-          <p:cNvSpPr txBox="1"/>
-          <p:nvPr/>
-        </p:nvSpPr>
-        <p:spPr>
-          <a:xfrm>
-            <a:off x="7491306" y="3925360"/>
-            <a:ext cx="2006266" cy="923330"/>
-          </a:xfrm>
-          <a:prstGeom prst="rect">
-            <a:avLst/>
-          </a:prstGeom>
-          <a:noFill/>
-        </p:spPr>
-        <p:txBody>
-          <a:bodyPr wrap="square">
-            <a:spAutoFit/>
-          </a:bodyPr>
-          <a:lstStyle/>
-          <a:p>
-            <a:r>
-              <a:rPr lang="de-DE" dirty="0"/>
-              <a:t>Spagetti Plot </a:t>
-            </a:r>
-            <a:r>
-              <a:rPr lang="de-DE" dirty="0" err="1"/>
-              <a:t>of</a:t>
-            </a:r>
-            <a:r>
-              <a:rPr lang="de-DE" dirty="0"/>
-              <a:t> </a:t>
-            </a:r>
-            <a:r>
-              <a:rPr lang="de-DE" dirty="0" err="1"/>
-              <a:t>the</a:t>
-            </a:r>
-            <a:r>
-              <a:rPr lang="de-DE" dirty="0"/>
-              <a:t> </a:t>
-            </a:r>
-            <a:r>
-              <a:rPr lang="de-DE" dirty="0" err="1"/>
-              <a:t>low</a:t>
-            </a:r>
-            <a:r>
-              <a:rPr lang="de-DE" dirty="0"/>
-              <a:t> </a:t>
-            </a:r>
-            <a:r>
-              <a:rPr lang="de-DE" dirty="0" err="1"/>
-              <a:t>motor</a:t>
-            </a:r>
-            <a:r>
-              <a:rPr lang="de-DE" dirty="0"/>
-              <a:t> score </a:t>
-            </a:r>
-            <a:r>
-              <a:rPr lang="de-DE" dirty="0" err="1"/>
-              <a:t>group</a:t>
-            </a:r>
-            <a:endParaRPr lang="de-DE" dirty="0"/>
-          </a:p>
-        </p:txBody>
-      </p:sp>
-      <p:sp>
-        <p:nvSpPr>
-          <p:cNvPr id="57" name="TextBox 56">
-            <a:extLst>
-              <a:ext uri="{FF2B5EF4-FFF2-40B4-BE49-F238E27FC236}">
-                <a16:creationId xmlns:a16="http://schemas.microsoft.com/office/drawing/2014/main" id="{9391366E-1370-B471-1307-8C8D1BCF7907}"/>
-              </a:ext>
-            </a:extLst>
-          </p:cNvPr>
-          <p:cNvSpPr txBox="1"/>
-          <p:nvPr/>
-        </p:nvSpPr>
-        <p:spPr>
-          <a:xfrm>
-            <a:off x="933450" y="6061185"/>
-            <a:ext cx="1257299" cy="338554"/>
-          </a:xfrm>
-          <a:prstGeom prst="rect">
-            <a:avLst/>
-          </a:prstGeom>
-          <a:solidFill>
-            <a:schemeClr val="bg1"/>
-          </a:solidFill>
-        </p:spPr>
-        <p:txBody>
-          <a:bodyPr wrap="square">
-            <a:spAutoFit/>
-          </a:bodyPr>
-          <a:lstStyle/>
-          <a:p>
-            <a:r>
-              <a:rPr lang="de-DE" sz="1600" dirty="0"/>
-              <a:t>Low   High</a:t>
-            </a:r>
-          </a:p>
-        </p:txBody>
-      </p:sp>
-      <p:sp>
-        <p:nvSpPr>
-          <p:cNvPr id="59" name="TextBox 58">
-            <a:extLst>
-              <a:ext uri="{FF2B5EF4-FFF2-40B4-BE49-F238E27FC236}">
-                <a16:creationId xmlns:a16="http://schemas.microsoft.com/office/drawing/2014/main" id="{DF082501-4FC4-B718-1180-D6375326A5D7}"/>
-              </a:ext>
-            </a:extLst>
-          </p:cNvPr>
-          <p:cNvSpPr txBox="1"/>
-          <p:nvPr/>
-        </p:nvSpPr>
-        <p:spPr>
-          <a:xfrm>
-            <a:off x="2178444" y="6085013"/>
-            <a:ext cx="1257299" cy="338554"/>
-          </a:xfrm>
-          <a:prstGeom prst="rect">
-            <a:avLst/>
-          </a:prstGeom>
-          <a:solidFill>
-            <a:schemeClr val="bg1"/>
-          </a:solidFill>
-        </p:spPr>
-        <p:txBody>
-          <a:bodyPr wrap="square">
-            <a:spAutoFit/>
-          </a:bodyPr>
-          <a:lstStyle/>
-          <a:p>
-            <a:r>
-              <a:rPr lang="de-DE" sz="1600" dirty="0"/>
-              <a:t>Low   High</a:t>
-            </a:r>
-          </a:p>
-        </p:txBody>
-      </p:sp>
-      <p:sp>
-        <p:nvSpPr>
-          <p:cNvPr id="60" name="TextBox 59">
-            <a:extLst>
-              <a:ext uri="{FF2B5EF4-FFF2-40B4-BE49-F238E27FC236}">
-                <a16:creationId xmlns:a16="http://schemas.microsoft.com/office/drawing/2014/main" id="{1D5327A2-C850-4BEC-8D5C-5B2E15C79C83}"/>
-              </a:ext>
-            </a:extLst>
-          </p:cNvPr>
-          <p:cNvSpPr txBox="1"/>
-          <p:nvPr/>
-        </p:nvSpPr>
-        <p:spPr>
-          <a:xfrm>
-            <a:off x="3503165" y="6061185"/>
-            <a:ext cx="1257299" cy="338554"/>
-          </a:xfrm>
-          <a:prstGeom prst="rect">
-            <a:avLst/>
-          </a:prstGeom>
-          <a:solidFill>
-            <a:schemeClr val="bg1"/>
-          </a:solidFill>
-        </p:spPr>
-        <p:txBody>
-          <a:bodyPr wrap="square">
-            <a:spAutoFit/>
-          </a:bodyPr>
-          <a:lstStyle/>
-          <a:p>
-            <a:r>
-              <a:rPr lang="de-DE" sz="1600" dirty="0"/>
-              <a:t>Low   High</a:t>
-            </a:r>
-          </a:p>
-        </p:txBody>
-      </p:sp>
-      <p:sp>
-        <p:nvSpPr>
-          <p:cNvPr id="61" name="TextBox 60">
-            <a:extLst>
-              <a:ext uri="{FF2B5EF4-FFF2-40B4-BE49-F238E27FC236}">
-                <a16:creationId xmlns:a16="http://schemas.microsoft.com/office/drawing/2014/main" id="{9B58EC3E-B4DD-A86F-4799-E01CBD6120D9}"/>
-              </a:ext>
-            </a:extLst>
-          </p:cNvPr>
-          <p:cNvSpPr txBox="1"/>
-          <p:nvPr/>
-        </p:nvSpPr>
-        <p:spPr>
-          <a:xfrm rot="16200000">
-            <a:off x="3919518" y="4666684"/>
-            <a:ext cx="2740357" cy="369332"/>
-          </a:xfrm>
-          <a:prstGeom prst="rect">
-            <a:avLst/>
-          </a:prstGeom>
-          <a:solidFill>
-            <a:schemeClr val="bg1"/>
-          </a:solidFill>
-        </p:spPr>
-        <p:txBody>
-          <a:bodyPr wrap="square">
-            <a:spAutoFit/>
-          </a:bodyPr>
-          <a:lstStyle/>
-          <a:p>
-            <a:r>
-              <a:rPr lang="en-GB" noProof="0" dirty="0"/>
-              <a:t>Distance to separation line</a:t>
-            </a:r>
-          </a:p>
-        </p:txBody>
-      </p:sp>
-      <p:sp>
-        <p:nvSpPr>
-          <p:cNvPr id="62" name="TextBox 61">
-            <a:extLst>
-              <a:ext uri="{FF2B5EF4-FFF2-40B4-BE49-F238E27FC236}">
-                <a16:creationId xmlns:a16="http://schemas.microsoft.com/office/drawing/2014/main" id="{16DA1ADA-66D3-7802-2CAD-6C16B6968B71}"/>
-              </a:ext>
-            </a:extLst>
-          </p:cNvPr>
-          <p:cNvSpPr txBox="1"/>
-          <p:nvPr/>
-        </p:nvSpPr>
-        <p:spPr>
-          <a:xfrm>
-            <a:off x="5839964" y="6423567"/>
-            <a:ext cx="1438538" cy="369332"/>
-          </a:xfrm>
-          <a:prstGeom prst="rect">
-            <a:avLst/>
-          </a:prstGeom>
-          <a:solidFill>
-            <a:schemeClr val="bg1"/>
-          </a:solidFill>
-        </p:spPr>
-        <p:txBody>
-          <a:bodyPr wrap="square">
-            <a:spAutoFit/>
-          </a:bodyPr>
-          <a:lstStyle/>
-          <a:p>
-            <a:r>
-              <a:rPr lang="de-DE" dirty="0"/>
-              <a:t>Time Point</a:t>
-            </a:r>
-          </a:p>
-        </p:txBody>
-      </p:sp>
       <p:pic>
         <p:nvPicPr>
-          <p:cNvPr id="66" name="Picture 65">
-            <a:extLst>
-              <a:ext uri="{FF2B5EF4-FFF2-40B4-BE49-F238E27FC236}">
-                <a16:creationId xmlns:a16="http://schemas.microsoft.com/office/drawing/2014/main" id="{A75A563C-90A9-16CA-C3BF-F3E6E26246A7}"/>
+          <p:cNvPr id="6" name="Graphic 5">
+            <a:extLst>
+              <a:ext uri="{FF2B5EF4-FFF2-40B4-BE49-F238E27FC236}">
+                <a16:creationId xmlns:a16="http://schemas.microsoft.com/office/drawing/2014/main" id="{6238B6BC-AF7C-F503-1440-785A2D08E5EE}"/>
               </a:ext>
             </a:extLst>
           </p:cNvPr>
@@ -4778,25 +4849,305 @@
           <p:nvPr/>
         </p:nvPicPr>
         <p:blipFill>
-          <a:blip r:embed="rId9"/>
+          <a:blip r:embed="rId3">
+            <a:extLst>
+              <a:ext uri="{96DAC541-7B7A-43D3-8B79-37D633B846F1}">
+                <asvg:svgBlip xmlns:asvg="http://schemas.microsoft.com/office/drawing/2016/SVG/main" r:embed="rId4"/>
+              </a:ext>
+            </a:extLst>
+          </a:blip>
+          <a:srcRect l="57287" t="5926" b="77130"/>
+          <a:stretch/>
+        </p:blipFill>
+        <p:spPr>
+          <a:xfrm>
+            <a:off x="2584619" y="248914"/>
+            <a:ext cx="2628357" cy="872939"/>
+          </a:xfrm>
+          <a:prstGeom prst="rect">
+            <a:avLst/>
+          </a:prstGeom>
+        </p:spPr>
+      </p:pic>
+      <p:pic>
+        <p:nvPicPr>
+          <p:cNvPr id="21" name="Picture 20">
+            <a:extLst>
+              <a:ext uri="{FF2B5EF4-FFF2-40B4-BE49-F238E27FC236}">
+                <a16:creationId xmlns:a16="http://schemas.microsoft.com/office/drawing/2014/main" id="{01BEB83F-D5A7-6432-914C-774474C6B477}"/>
+              </a:ext>
+            </a:extLst>
+          </p:cNvPr>
+          <p:cNvPicPr>
+            <a:picLocks noChangeAspect="1"/>
+          </p:cNvPicPr>
+          <p:nvPr/>
+        </p:nvPicPr>
+        <p:blipFill>
+          <a:blip r:embed="rId5"/>
           <a:stretch>
             <a:fillRect/>
           </a:stretch>
         </p:blipFill>
         <p:spPr>
           <a:xfrm>
-            <a:off x="10133768" y="2776814"/>
-            <a:ext cx="3106813" cy="4143752"/>
+            <a:off x="2836097" y="1059760"/>
+            <a:ext cx="1932660" cy="1932660"/>
           </a:xfrm>
           <a:prstGeom prst="rect">
             <a:avLst/>
           </a:prstGeom>
         </p:spPr>
       </p:pic>
+      <p:sp>
+        <p:nvSpPr>
+          <p:cNvPr id="23" name="TextBox 22">
+            <a:extLst>
+              <a:ext uri="{FF2B5EF4-FFF2-40B4-BE49-F238E27FC236}">
+                <a16:creationId xmlns:a16="http://schemas.microsoft.com/office/drawing/2014/main" id="{4A2B5BD0-E84B-81D2-D254-1C88B88B0F10}"/>
+              </a:ext>
+            </a:extLst>
+          </p:cNvPr>
+          <p:cNvSpPr txBox="1"/>
+          <p:nvPr/>
+        </p:nvSpPr>
+        <p:spPr>
+          <a:xfrm>
+            <a:off x="253259" y="3441680"/>
+            <a:ext cx="6100482" cy="1015663"/>
+          </a:xfrm>
+          <a:prstGeom prst="rect">
+            <a:avLst/>
+          </a:prstGeom>
+          <a:noFill/>
+        </p:spPr>
+        <p:txBody>
+          <a:bodyPr wrap="square">
+            <a:spAutoFit/>
+          </a:bodyPr>
+          <a:lstStyle/>
+          <a:p>
+            <a:r>
+              <a:rPr lang="en-US" sz="1200" dirty="0"/>
+              <a:t>Overall Recovery Type Percentages:</a:t>
+            </a:r>
+          </a:p>
+          <a:p>
+            <a:r>
+              <a:rPr lang="en-US" sz="1200" dirty="0"/>
+              <a:t>Steady recovery: 59.46% (22 out of 37)</a:t>
+            </a:r>
+          </a:p>
+          <a:p>
+            <a:r>
+              <a:rPr lang="en-US" sz="1200" dirty="0"/>
+              <a:t>Steady decline: 2.70% (1 out of 37)</a:t>
+            </a:r>
+          </a:p>
+          <a:p>
+            <a:r>
+              <a:rPr lang="en-US" sz="1200" dirty="0"/>
+              <a:t>Early recovery with chronic decline: 13.51% (5 out of 37)</a:t>
+            </a:r>
+          </a:p>
+          <a:p>
+            <a:r>
+              <a:rPr lang="en-US" sz="1200" dirty="0"/>
+              <a:t>Late recovery with acute decline: 24.32% (9 out of 37)</a:t>
+            </a:r>
+          </a:p>
+        </p:txBody>
+      </p:sp>
+      <p:pic>
+        <p:nvPicPr>
+          <p:cNvPr id="27" name="Graphic 26">
+            <a:extLst>
+              <a:ext uri="{FF2B5EF4-FFF2-40B4-BE49-F238E27FC236}">
+                <a16:creationId xmlns:a16="http://schemas.microsoft.com/office/drawing/2014/main" id="{B3CF9992-B620-C8FC-6E53-A40E37EFCA1A}"/>
+              </a:ext>
+            </a:extLst>
+          </p:cNvPr>
+          <p:cNvPicPr>
+            <a:picLocks noChangeAspect="1"/>
+          </p:cNvPicPr>
+          <p:nvPr/>
+        </p:nvPicPr>
+        <p:blipFill>
+          <a:blip r:embed="rId6">
+            <a:extLst>
+              <a:ext uri="{96DAC541-7B7A-43D3-8B79-37D633B846F1}">
+                <asvg:svgBlip xmlns:asvg="http://schemas.microsoft.com/office/drawing/2016/SVG/main" r:embed="rId7"/>
+              </a:ext>
+            </a:extLst>
+          </a:blip>
+          <a:stretch>
+            <a:fillRect/>
+          </a:stretch>
+        </p:blipFill>
+        <p:spPr>
+          <a:xfrm>
+            <a:off x="7871012" y="183776"/>
+            <a:ext cx="2001931" cy="3245421"/>
+          </a:xfrm>
+          <a:prstGeom prst="rect">
+            <a:avLst/>
+          </a:prstGeom>
+        </p:spPr>
+      </p:pic>
+      <p:pic>
+        <p:nvPicPr>
+          <p:cNvPr id="29" name="Graphic 28">
+            <a:extLst>
+              <a:ext uri="{FF2B5EF4-FFF2-40B4-BE49-F238E27FC236}">
+                <a16:creationId xmlns:a16="http://schemas.microsoft.com/office/drawing/2014/main" id="{38E1F39C-B03B-821E-7877-03AE4C3582E9}"/>
+              </a:ext>
+            </a:extLst>
+          </p:cNvPr>
+          <p:cNvPicPr>
+            <a:picLocks noChangeAspect="1"/>
+          </p:cNvPicPr>
+          <p:nvPr/>
+        </p:nvPicPr>
+        <p:blipFill>
+          <a:blip r:embed="rId8">
+            <a:extLst>
+              <a:ext uri="{96DAC541-7B7A-43D3-8B79-37D633B846F1}">
+                <asvg:svgBlip xmlns:asvg="http://schemas.microsoft.com/office/drawing/2016/SVG/main" r:embed="rId9"/>
+              </a:ext>
+            </a:extLst>
+          </a:blip>
+          <a:stretch>
+            <a:fillRect/>
+          </a:stretch>
+        </p:blipFill>
+        <p:spPr>
+          <a:xfrm>
+            <a:off x="10031069" y="183776"/>
+            <a:ext cx="1975474" cy="3245422"/>
+          </a:xfrm>
+          <a:prstGeom prst="rect">
+            <a:avLst/>
+          </a:prstGeom>
+        </p:spPr>
+      </p:pic>
+      <p:sp>
+        <p:nvSpPr>
+          <p:cNvPr id="31" name="TextBox 30">
+            <a:extLst>
+              <a:ext uri="{FF2B5EF4-FFF2-40B4-BE49-F238E27FC236}">
+                <a16:creationId xmlns:a16="http://schemas.microsoft.com/office/drawing/2014/main" id="{2135DF4D-1F84-84EC-1BE6-EC21B7F45E88}"/>
+              </a:ext>
+            </a:extLst>
+          </p:cNvPr>
+          <p:cNvSpPr txBox="1"/>
+          <p:nvPr/>
+        </p:nvSpPr>
+        <p:spPr>
+          <a:xfrm>
+            <a:off x="8095813" y="3794719"/>
+            <a:ext cx="3870512" cy="2123658"/>
+          </a:xfrm>
+          <a:prstGeom prst="rect">
+            <a:avLst/>
+          </a:prstGeom>
+          <a:noFill/>
+        </p:spPr>
+        <p:txBody>
+          <a:bodyPr wrap="square">
+            <a:spAutoFit/>
+          </a:bodyPr>
+          <a:lstStyle/>
+          <a:p>
+            <a:r>
+              <a:rPr lang="en-GB" sz="1100" noProof="0"/>
+              <a:t>Recovery Type Percentages by </a:t>
+            </a:r>
+            <a:r>
+              <a:rPr lang="en-GB" sz="1100" noProof="0" dirty="0" err="1"/>
+              <a:t>Fixed_Type</a:t>
+            </a:r>
+            <a:r>
+              <a:rPr lang="en-GB" sz="1100" noProof="0" dirty="0"/>
+              <a:t>:</a:t>
+            </a:r>
+          </a:p>
+          <a:p>
+            <a:r>
+              <a:rPr lang="en-GB" sz="1100" noProof="0" dirty="0" err="1"/>
+              <a:t>Fixed_Type</a:t>
+            </a:r>
+            <a:r>
+              <a:rPr lang="en-GB" sz="1100" noProof="0" dirty="0"/>
+              <a:t>: bad</a:t>
+            </a:r>
+          </a:p>
+          <a:p>
+            <a:r>
+              <a:rPr lang="en-GB" sz="1100" noProof="0" dirty="0"/>
+              <a:t>  Steady recovery: 68.75% (11 out of 16)</a:t>
+            </a:r>
+          </a:p>
+          <a:p>
+            <a:r>
+              <a:rPr lang="en-GB" sz="1100" noProof="0" dirty="0"/>
+              <a:t>  Steady decline: 6.25% (1 out of 16)</a:t>
+            </a:r>
+          </a:p>
+          <a:p>
+            <a:r>
+              <a:rPr lang="en-GB" sz="1100" noProof="0" dirty="0"/>
+              <a:t>  Early recovery with chronic decline: 6.25% (1 out of 16)</a:t>
+            </a:r>
+          </a:p>
+          <a:p>
+            <a:r>
+              <a:rPr lang="en-GB" sz="1100" noProof="0" dirty="0"/>
+              <a:t>  Late recovery with acute decline: 18.75% (3 out of 16)</a:t>
+            </a:r>
+          </a:p>
+          <a:p>
+            <a:endParaRPr lang="en-GB" sz="1100" noProof="0" dirty="0"/>
+          </a:p>
+          <a:p>
+            <a:r>
+              <a:rPr lang="en-GB" sz="1100" noProof="0" dirty="0" err="1"/>
+              <a:t>Fixed_Type</a:t>
+            </a:r>
+            <a:r>
+              <a:rPr lang="en-GB" sz="1100" noProof="0" dirty="0"/>
+              <a:t>: good</a:t>
+            </a:r>
+          </a:p>
+          <a:p>
+            <a:r>
+              <a:rPr lang="en-GB" sz="1100" noProof="0" dirty="0"/>
+              <a:t>  Steady recovery: 52.38% (11 out of 21)</a:t>
+            </a:r>
+          </a:p>
+          <a:p>
+            <a:r>
+              <a:rPr lang="en-GB" sz="1100" noProof="0" dirty="0"/>
+              <a:t>  Steady decline: 0.00% (0 out of 21)</a:t>
+            </a:r>
+          </a:p>
+          <a:p>
+            <a:r>
+              <a:rPr lang="en-GB" sz="1100" noProof="0" dirty="0"/>
+              <a:t>  Early recovery with chronic decline: 19.05% (4 out of 21)</a:t>
+            </a:r>
+          </a:p>
+          <a:p>
+            <a:r>
+              <a:rPr lang="en-GB" sz="1100" noProof="0" dirty="0"/>
+              <a:t>  Late recovery with acute decline: 28.57% (6 out of 21)</a:t>
+            </a:r>
+          </a:p>
+        </p:txBody>
+      </p:sp>
     </p:spTree>
     <p:extLst>
       <p:ext uri="{BB962C8B-B14F-4D97-AF65-F5344CB8AC3E}">
-        <p14:creationId xmlns:p14="http://schemas.microsoft.com/office/powerpoint/2010/main" val="3901278525"/>
+        <p14:creationId xmlns:p14="http://schemas.microsoft.com/office/powerpoint/2010/main" val="4163573703"/>
       </p:ext>
     </p:extLst>
   </p:cSld>
@@ -4806,7 +5157,7 @@
 </p:sld>
 </file>
 
-<file path=ppt/slides/slide2.xml><?xml version="1.0" encoding="utf-8"?>
+<file path=ppt/slides/slide3.xml><?xml version="1.0" encoding="utf-8"?>
 <p:sld xmlns:a="http://schemas.openxmlformats.org/drawingml/2006/main" xmlns:r="http://schemas.openxmlformats.org/officeDocument/2006/relationships" xmlns:p="http://schemas.openxmlformats.org/presentationml/2006/main">
   <p:cSld>
     <p:spTree>

</xml_diff>